<commit_message>
Added AWS code and files
</commit_message>
<xml_diff>
--- a/Wireless Kegerator talking to AWS.pptx
+++ b/Wireless Kegerator talking to AWS.pptx
@@ -3282,7 +3282,23 @@
                   <a:schemeClr val="accent6"/>
                 </a:solidFill>
               </a:rPr>
-              <a:t> project using ESP8266</a:t>
+              <a:t> </a:t>
+            </a:r>
+            <a:r>
+              <a:rPr lang="en-US" sz="3600" b="1" dirty="0" smtClean="0">
+                <a:solidFill>
+                  <a:schemeClr val="accent6"/>
+                </a:solidFill>
+              </a:rPr>
+              <a:t>projects </a:t>
+            </a:r>
+            <a:r>
+              <a:rPr lang="en-US" sz="3600" b="1" dirty="0" smtClean="0">
+                <a:solidFill>
+                  <a:schemeClr val="accent6"/>
+                </a:solidFill>
+              </a:rPr>
+              <a:t>using ESP8266</a:t>
             </a:r>
             <a:br>
               <a:rPr lang="en-US" sz="3600" b="1" dirty="0" smtClean="0">
@@ -3317,6 +3333,13 @@
   <p:clrMapOvr>
     <a:masterClrMapping/>
   </p:clrMapOvr>
+  <p:timing>
+    <p:tnLst>
+      <p:par>
+        <p:cTn id="1" dur="indefinite" restart="never" nodeType="tmRoot"/>
+      </p:par>
+    </p:tnLst>
+  </p:timing>
 </p:sld>
 </file>
 
@@ -3567,6 +3590,13 @@
   <p:clrMapOvr>
     <a:masterClrMapping/>
   </p:clrMapOvr>
+  <p:timing>
+    <p:tnLst>
+      <p:par>
+        <p:cTn id="1" dur="indefinite" restart="never" nodeType="tmRoot"/>
+      </p:par>
+    </p:tnLst>
+  </p:timing>
 </p:sld>
 </file>
 
@@ -3697,7 +3727,6 @@
               <a:rPr lang="en-US" sz="2800" dirty="0"/>
               <a:t>GPIO_15 needs to be pulled low to boot, GPI_0 is high to boot from flash, low to boot from serial (upload code), GPIO_2 needs to be high at boot</a:t>
             </a:r>
-            <a:endParaRPr lang="en-US" sz="2800" dirty="0"/>
           </a:p>
           <a:p>
             <a:endParaRPr lang="en-US" sz="2600" dirty="0"/>
@@ -3939,6 +3968,13 @@
   <p:clrMapOvr>
     <a:masterClrMapping/>
   </p:clrMapOvr>
+  <p:timing>
+    <p:tnLst>
+      <p:par>
+        <p:cTn id="1" dur="indefinite" restart="never" nodeType="tmRoot"/>
+      </p:par>
+    </p:tnLst>
+  </p:timing>
 </p:sld>
 </file>
 
@@ -4151,6 +4187,13 @@
   <p:clrMapOvr>
     <a:masterClrMapping/>
   </p:clrMapOvr>
+  <p:timing>
+    <p:tnLst>
+      <p:par>
+        <p:cTn id="1" dur="indefinite" restart="never" nodeType="tmRoot"/>
+      </p:par>
+    </p:tnLst>
+  </p:timing>
 </p:sld>
 </file>
 
@@ -5256,6 +5299,13 @@
   <p:clrMapOvr>
     <a:masterClrMapping/>
   </p:clrMapOvr>
+  <p:timing>
+    <p:tnLst>
+      <p:par>
+        <p:cTn id="1" dur="indefinite" restart="never" nodeType="tmRoot"/>
+      </p:par>
+    </p:tnLst>
+  </p:timing>
 </p:sld>
 </file>
 
@@ -5354,23 +5404,20 @@
             </a:r>
             <a:r>
               <a:rPr lang="en-US" dirty="0" smtClean="0"/>
-              <a:t> – wireless client, AP, </a:t>
+              <a:t> – wireless </a:t>
+            </a:r>
+            <a:r>
+              <a:rPr lang="en-US" dirty="0" smtClean="0"/>
+              <a:t>Arduino IDE</a:t>
             </a:r>
             <a:br>
               <a:rPr lang="en-US" dirty="0" smtClean="0"/>
             </a:br>
             <a:r>
               <a:rPr lang="en-US" dirty="0" smtClean="0"/>
-              <a:t>webserver, </a:t>
-            </a:r>
-            <a:r>
-              <a:rPr lang="en-US" dirty="0"/>
-              <a:t>A</a:t>
-            </a:r>
-            <a:r>
-              <a:rPr lang="en-US" dirty="0" smtClean="0"/>
-              <a:t>rduino IDE compatible</a:t>
-            </a:r>
+              <a:t>compatible device w IO</a:t>
+            </a:r>
+            <a:endParaRPr lang="en-US" dirty="0" smtClean="0"/>
           </a:p>
           <a:p>
             <a:r>
@@ -5490,6 +5537,13 @@
   <p:clrMapOvr>
     <a:masterClrMapping/>
   </p:clrMapOvr>
+  <p:timing>
+    <p:tnLst>
+      <p:par>
+        <p:cTn id="1" dur="indefinite" restart="never" nodeType="tmRoot"/>
+      </p:par>
+    </p:tnLst>
+  </p:timing>
 </p:sld>
 </file>
 
@@ -5661,6 +5715,13 @@
   <p:clrMapOvr>
     <a:masterClrMapping/>
   </p:clrMapOvr>
+  <p:timing>
+    <p:tnLst>
+      <p:par>
+        <p:cTn id="1" dur="indefinite" restart="never" nodeType="tmRoot"/>
+      </p:par>
+    </p:tnLst>
+  </p:timing>
 </p:sld>
 </file>
 
@@ -5902,6 +5963,13 @@
   <p:clrMapOvr>
     <a:masterClrMapping/>
   </p:clrMapOvr>
+  <p:timing>
+    <p:tnLst>
+      <p:par>
+        <p:cTn id="1" dur="indefinite" restart="never" nodeType="tmRoot"/>
+      </p:par>
+    </p:tnLst>
+  </p:timing>
 </p:sld>
 </file>
 
@@ -6043,6 +6111,13 @@
   <p:clrMapOvr>
     <a:masterClrMapping/>
   </p:clrMapOvr>
+  <p:timing>
+    <p:tnLst>
+      <p:par>
+        <p:cTn id="1" dur="indefinite" restart="never" nodeType="tmRoot"/>
+      </p:par>
+    </p:tnLst>
+  </p:timing>
 </p:sld>
 </file>
 
@@ -6326,6 +6401,13 @@
   <p:clrMapOvr>
     <a:masterClrMapping/>
   </p:clrMapOvr>
+  <p:timing>
+    <p:tnLst>
+      <p:par>
+        <p:cTn id="1" dur="indefinite" restart="never" nodeType="tmRoot"/>
+      </p:par>
+    </p:tnLst>
+  </p:timing>
 </p:sld>
 </file>
 
@@ -6502,6 +6584,13 @@
   <p:clrMapOvr>
     <a:masterClrMapping/>
   </p:clrMapOvr>
+  <p:timing>
+    <p:tnLst>
+      <p:par>
+        <p:cTn id="1" dur="indefinite" restart="never" nodeType="tmRoot"/>
+      </p:par>
+    </p:tnLst>
+  </p:timing>
 </p:sld>
 </file>
 
@@ -6911,6 +7000,13 @@
   <p:clrMapOvr>
     <a:masterClrMapping/>
   </p:clrMapOvr>
+  <p:timing>
+    <p:tnLst>
+      <p:par>
+        <p:cTn id="1" dur="indefinite" restart="never" nodeType="tmRoot"/>
+      </p:par>
+    </p:tnLst>
+  </p:timing>
 </p:sld>
 </file>
 

</xml_diff>